<commit_message>
fix pull image for synch chapter
</commit_message>
<xml_diff>
--- a/materials/images/GitKit-Text-Soure-Images.pptx
+++ b/materials/images/GitKit-Text-Soure-Images.pptx
@@ -137,6 +137,67 @@
 </p:presentation>
 </file>
 
+<file path=ppt/changesInfos/changesInfo1.xml><?xml version="1.0" encoding="utf-8"?>
+<pc:chgInfo xmlns:a="http://schemas.openxmlformats.org/drawingml/2006/main" xmlns:r="http://schemas.openxmlformats.org/officeDocument/2006/relationships" xmlns:ac="http://schemas.microsoft.com/office/drawing/2013/main/command" xmlns:pc="http://schemas.microsoft.com/office/powerpoint/2013/main/command">
+  <pc:docChgLst>
+    <pc:chgData name="Braught, Grant" userId="13082181-f9d5-4011-899e-2afe75cd93c2" providerId="ADAL" clId="{7D2CC41B-BB9E-8945-B803-607365FBBFE9}"/>
+    <pc:docChg chg="undo custSel modSld">
+      <pc:chgData name="Braught, Grant" userId="13082181-f9d5-4011-899e-2afe75cd93c2" providerId="ADAL" clId="{7D2CC41B-BB9E-8945-B803-607365FBBFE9}" dt="2025-02-09T22:55:40.903" v="11" actId="478"/>
+      <pc:docMkLst>
+        <pc:docMk/>
+      </pc:docMkLst>
+      <pc:sldChg chg="addSp delSp mod">
+        <pc:chgData name="Braught, Grant" userId="13082181-f9d5-4011-899e-2afe75cd93c2" providerId="ADAL" clId="{7D2CC41B-BB9E-8945-B803-607365FBBFE9}" dt="2025-02-09T22:55:40.903" v="11" actId="478"/>
+        <pc:sldMkLst>
+          <pc:docMk/>
+          <pc:sldMk cId="1658481695" sldId="278"/>
+        </pc:sldMkLst>
+        <pc:spChg chg="add del">
+          <ac:chgData name="Braught, Grant" userId="13082181-f9d5-4011-899e-2afe75cd93c2" providerId="ADAL" clId="{7D2CC41B-BB9E-8945-B803-607365FBBFE9}" dt="2025-02-09T22:55:34.346" v="8" actId="478"/>
+          <ac:spMkLst>
+            <pc:docMk/>
+            <pc:sldMk cId="1658481695" sldId="278"/>
+            <ac:spMk id="9" creationId="{D41D927E-AEF2-9537-2250-CB19245F1978}"/>
+          </ac:spMkLst>
+        </pc:spChg>
+        <pc:spChg chg="add del">
+          <ac:chgData name="Braught, Grant" userId="13082181-f9d5-4011-899e-2afe75cd93c2" providerId="ADAL" clId="{7D2CC41B-BB9E-8945-B803-607365FBBFE9}" dt="2025-02-09T22:55:39.755" v="10" actId="478"/>
+          <ac:spMkLst>
+            <pc:docMk/>
+            <pc:sldMk cId="1658481695" sldId="278"/>
+            <ac:spMk id="41" creationId="{D92B3D46-C7F4-E8F5-D0C0-402F96C46710}"/>
+          </ac:spMkLst>
+        </pc:spChg>
+        <pc:spChg chg="add del">
+          <ac:chgData name="Braught, Grant" userId="13082181-f9d5-4011-899e-2afe75cd93c2" providerId="ADAL" clId="{7D2CC41B-BB9E-8945-B803-607365FBBFE9}" dt="2025-02-09T22:55:38.343" v="9" actId="478"/>
+          <ac:spMkLst>
+            <pc:docMk/>
+            <pc:sldMk cId="1658481695" sldId="278"/>
+            <ac:spMk id="58" creationId="{8A711A4D-FC20-6662-D84D-705BC85C4974}"/>
+          </ac:spMkLst>
+        </pc:spChg>
+        <pc:spChg chg="del">
+          <ac:chgData name="Braught, Grant" userId="13082181-f9d5-4011-899e-2afe75cd93c2" providerId="ADAL" clId="{7D2CC41B-BB9E-8945-B803-607365FBBFE9}" dt="2025-02-09T22:52:30.555" v="0" actId="478"/>
+          <ac:spMkLst>
+            <pc:docMk/>
+            <pc:sldMk cId="1658481695" sldId="278"/>
+            <ac:spMk id="59" creationId="{318541E5-A33C-7F52-D7F7-E116DDE81EA7}"/>
+          </ac:spMkLst>
+        </pc:spChg>
+        <pc:cxnChg chg="add del">
+          <ac:chgData name="Braught, Grant" userId="13082181-f9d5-4011-899e-2afe75cd93c2" providerId="ADAL" clId="{7D2CC41B-BB9E-8945-B803-607365FBBFE9}" dt="2025-02-09T22:55:40.903" v="11" actId="478"/>
+          <ac:cxnSpMkLst>
+            <pc:docMk/>
+            <pc:sldMk cId="1658481695" sldId="278"/>
+            <ac:cxnSpMk id="40" creationId="{484B8BF8-BAA9-5ABD-178B-0DC6844108E1}"/>
+          </ac:cxnSpMkLst>
+        </pc:cxnChg>
+      </pc:sldChg>
+    </pc:docChg>
+  </pc:docChgLst>
+</pc:chgInfo>
+</file>
+
 <file path=ppt/notesMasters/notesMaster1.xml><?xml version="1.0" encoding="utf-8"?>
 <p:notesMaster xmlns:a="http://schemas.openxmlformats.org/drawingml/2006/main" xmlns:r="http://schemas.openxmlformats.org/officeDocument/2006/relationships" xmlns:p="http://schemas.openxmlformats.org/presentationml/2006/main">
   <p:cSld>
@@ -219,7 +280,7 @@
           <a:p>
             <a:fld id="{54450688-851B-C844-9616-D91E312B1884}" type="datetimeFigureOut">
               <a:rPr lang="en-US" smtClean="0"/>
-              <a:t>1/25/25</a:t>
+              <a:t>2/9/25</a:t>
             </a:fld>
             <a:endParaRPr lang="en-US"/>
           </a:p>
@@ -769,7 +830,7 @@
           <a:p>
             <a:fld id="{7A82D7F2-23D8-094A-BC7F-45020389E464}" type="datetimeFigureOut">
               <a:rPr lang="en-US" smtClean="0"/>
-              <a:t>1/25/25</a:t>
+              <a:t>2/9/25</a:t>
             </a:fld>
             <a:endParaRPr lang="en-US"/>
           </a:p>
@@ -966,7 +1027,7 @@
           <a:p>
             <a:fld id="{7A82D7F2-23D8-094A-BC7F-45020389E464}" type="datetimeFigureOut">
               <a:rPr lang="en-US" smtClean="0"/>
-              <a:t>1/25/25</a:t>
+              <a:t>2/9/25</a:t>
             </a:fld>
             <a:endParaRPr lang="en-US"/>
           </a:p>
@@ -1240,7 +1301,7 @@
           <a:p>
             <a:fld id="{7A82D7F2-23D8-094A-BC7F-45020389E464}" type="datetimeFigureOut">
               <a:rPr lang="en-US" smtClean="0"/>
-              <a:t>1/25/25</a:t>
+              <a:t>2/9/25</a:t>
             </a:fld>
             <a:endParaRPr lang="en-US"/>
           </a:p>
@@ -1424,7 +1485,7 @@
           <a:p>
             <a:fld id="{7A82D7F2-23D8-094A-BC7F-45020389E464}" type="datetimeFigureOut">
               <a:rPr lang="en-US" smtClean="0"/>
-              <a:t>1/25/25</a:t>
+              <a:t>2/9/25</a:t>
             </a:fld>
             <a:endParaRPr lang="en-US"/>
           </a:p>
@@ -1628,7 +1689,7 @@
           <a:p>
             <a:fld id="{7A82D7F2-23D8-094A-BC7F-45020389E464}" type="datetimeFigureOut">
               <a:rPr lang="en-US" smtClean="0"/>
-              <a:t>1/25/25</a:t>
+              <a:t>2/9/25</a:t>
             </a:fld>
             <a:endParaRPr lang="en-US"/>
           </a:p>
@@ -1875,7 +1936,7 @@
           <a:p>
             <a:fld id="{7A82D7F2-23D8-094A-BC7F-45020389E464}" type="datetimeFigureOut">
               <a:rPr lang="en-US" smtClean="0"/>
-              <a:t>1/25/25</a:t>
+              <a:t>2/9/25</a:t>
             </a:fld>
             <a:endParaRPr lang="en-US"/>
           </a:p>
@@ -2203,7 +2264,7 @@
           <a:p>
             <a:fld id="{7A82D7F2-23D8-094A-BC7F-45020389E464}" type="datetimeFigureOut">
               <a:rPr lang="en-US" smtClean="0"/>
-              <a:t>1/25/25</a:t>
+              <a:t>2/9/25</a:t>
             </a:fld>
             <a:endParaRPr lang="en-US"/>
           </a:p>
@@ -2506,7 +2567,7 @@
           <a:p>
             <a:fld id="{7A82D7F2-23D8-094A-BC7F-45020389E464}" type="datetimeFigureOut">
               <a:rPr lang="en-US" smtClean="0"/>
-              <a:t>1/25/25</a:t>
+              <a:t>2/9/25</a:t>
             </a:fld>
             <a:endParaRPr lang="en-US"/>
           </a:p>
@@ -2967,7 +3028,7 @@
           <a:p>
             <a:fld id="{7A82D7F2-23D8-094A-BC7F-45020389E464}" type="datetimeFigureOut">
               <a:rPr lang="en-US" smtClean="0"/>
-              <a:t>1/25/25</a:t>
+              <a:t>2/9/25</a:t>
             </a:fld>
             <a:endParaRPr lang="en-US"/>
           </a:p>
@@ -3085,7 +3146,7 @@
           <a:p>
             <a:fld id="{7A82D7F2-23D8-094A-BC7F-45020389E464}" type="datetimeFigureOut">
               <a:rPr lang="en-US" smtClean="0"/>
-              <a:t>1/25/25</a:t>
+              <a:t>2/9/25</a:t>
             </a:fld>
             <a:endParaRPr lang="en-US"/>
           </a:p>
@@ -3180,7 +3241,7 @@
           <a:p>
             <a:fld id="{7A82D7F2-23D8-094A-BC7F-45020389E464}" type="datetimeFigureOut">
               <a:rPr lang="en-US" smtClean="0"/>
-              <a:t>1/25/25</a:t>
+              <a:t>2/9/25</a:t>
             </a:fld>
             <a:endParaRPr lang="en-US"/>
           </a:p>
@@ -3467,7 +3528,7 @@
           <a:p>
             <a:fld id="{7A82D7F2-23D8-094A-BC7F-45020389E464}" type="datetimeFigureOut">
               <a:rPr lang="en-US" smtClean="0"/>
-              <a:t>1/25/25</a:t>
+              <a:t>2/9/25</a:t>
             </a:fld>
             <a:endParaRPr lang="en-US"/>
           </a:p>
@@ -3681,7 +3742,7 @@
           <a:p>
             <a:fld id="{7A82D7F2-23D8-094A-BC7F-45020389E464}" type="datetimeFigureOut">
               <a:rPr lang="en-US" smtClean="0"/>
-              <a:t>1/25/25</a:t>
+              <a:t>2/9/25</a:t>
             </a:fld>
             <a:endParaRPr lang="en-US"/>
           </a:p>
@@ -19316,99 +19377,6 @@
           </a:p>
         </p:txBody>
       </p:sp>
-      <p:cxnSp>
-        <p:nvCxnSpPr>
-          <p:cNvPr id="40" name="Straight Connector 39">
-            <a:extLst>
-              <a:ext uri="{FF2B5EF4-FFF2-40B4-BE49-F238E27FC236}">
-                <a16:creationId xmlns:a16="http://schemas.microsoft.com/office/drawing/2014/main" id="{484B8BF8-BAA9-5ABD-178B-0DC6844108E1}"/>
-              </a:ext>
-            </a:extLst>
-          </p:cNvPr>
-          <p:cNvCxnSpPr/>
-          <p:nvPr/>
-        </p:nvCxnSpPr>
-        <p:spPr>
-          <a:xfrm flipV="1">
-            <a:off x="4495685" y="2035080"/>
-            <a:ext cx="105890" cy="3288"/>
-          </a:xfrm>
-          <a:prstGeom prst="line">
-            <a:avLst/>
-          </a:prstGeom>
-          <a:ln>
-            <a:solidFill>
-              <a:schemeClr val="tx1"/>
-            </a:solidFill>
-          </a:ln>
-        </p:spPr>
-        <p:style>
-          <a:lnRef idx="3">
-            <a:schemeClr val="accent5"/>
-          </a:lnRef>
-          <a:fillRef idx="0">
-            <a:schemeClr val="accent5"/>
-          </a:fillRef>
-          <a:effectRef idx="2">
-            <a:schemeClr val="accent5"/>
-          </a:effectRef>
-          <a:fontRef idx="minor">
-            <a:schemeClr val="tx1"/>
-          </a:fontRef>
-        </p:style>
-      </p:cxnSp>
-      <p:sp>
-        <p:nvSpPr>
-          <p:cNvPr id="41" name="Oval 40">
-            <a:extLst>
-              <a:ext uri="{FF2B5EF4-FFF2-40B4-BE49-F238E27FC236}">
-                <a16:creationId xmlns:a16="http://schemas.microsoft.com/office/drawing/2014/main" id="{D92B3D46-C7F4-E8F5-D0C0-402F96C46710}"/>
-              </a:ext>
-            </a:extLst>
-          </p:cNvPr>
-          <p:cNvSpPr/>
-          <p:nvPr/>
-        </p:nvSpPr>
-        <p:spPr>
-          <a:xfrm>
-            <a:off x="4596201" y="1964358"/>
-            <a:ext cx="140086" cy="140086"/>
-          </a:xfrm>
-          <a:prstGeom prst="ellipse">
-            <a:avLst/>
-          </a:prstGeom>
-          <a:solidFill>
-            <a:srgbClr val="00B0F0"/>
-          </a:solidFill>
-          <a:ln>
-            <a:solidFill>
-              <a:schemeClr val="tx1"/>
-            </a:solidFill>
-          </a:ln>
-        </p:spPr>
-        <p:style>
-          <a:lnRef idx="3">
-            <a:schemeClr val="lt1"/>
-          </a:lnRef>
-          <a:fillRef idx="1">
-            <a:schemeClr val="accent6"/>
-          </a:fillRef>
-          <a:effectRef idx="1">
-            <a:schemeClr val="accent6"/>
-          </a:effectRef>
-          <a:fontRef idx="minor">
-            <a:schemeClr val="lt1"/>
-          </a:fontRef>
-        </p:style>
-        <p:txBody>
-          <a:bodyPr rtlCol="0" anchor="ctr"/>
-          <a:lstStyle/>
-          <a:p>
-            <a:pPr algn="ctr"/>
-            <a:endParaRPr lang="en-US"/>
-          </a:p>
-        </p:txBody>
-      </p:sp>
       <p:sp>
         <p:nvSpPr>
           <p:cNvPr id="42" name="Up Arrow 41">
@@ -20106,116 +20074,6 @@
         <p:spPr>
           <a:xfrm>
             <a:off x="4934332" y="4674236"/>
-            <a:ext cx="140086" cy="140086"/>
-          </a:xfrm>
-          <a:prstGeom prst="ellipse">
-            <a:avLst/>
-          </a:prstGeom>
-          <a:solidFill>
-            <a:schemeClr val="accent5">
-              <a:lumMod val="60000"/>
-              <a:lumOff val="40000"/>
-            </a:schemeClr>
-          </a:solidFill>
-          <a:ln>
-            <a:solidFill>
-              <a:schemeClr val="tx1"/>
-            </a:solidFill>
-          </a:ln>
-        </p:spPr>
-        <p:style>
-          <a:lnRef idx="3">
-            <a:schemeClr val="lt1"/>
-          </a:lnRef>
-          <a:fillRef idx="1">
-            <a:schemeClr val="accent6"/>
-          </a:fillRef>
-          <a:effectRef idx="1">
-            <a:schemeClr val="accent6"/>
-          </a:effectRef>
-          <a:fontRef idx="minor">
-            <a:schemeClr val="lt1"/>
-          </a:fontRef>
-        </p:style>
-        <p:txBody>
-          <a:bodyPr rtlCol="0" anchor="ctr"/>
-          <a:lstStyle/>
-          <a:p>
-            <a:pPr algn="ctr"/>
-            <a:endParaRPr lang="en-US"/>
-          </a:p>
-        </p:txBody>
-      </p:sp>
-      <p:sp>
-        <p:nvSpPr>
-          <p:cNvPr id="58" name="Oval 57">
-            <a:extLst>
-              <a:ext uri="{FF2B5EF4-FFF2-40B4-BE49-F238E27FC236}">
-                <a16:creationId xmlns:a16="http://schemas.microsoft.com/office/drawing/2014/main" id="{8A711A4D-FC20-6662-D84D-705BC85C4974}"/>
-              </a:ext>
-            </a:extLst>
-          </p:cNvPr>
-          <p:cNvSpPr/>
-          <p:nvPr/>
-        </p:nvSpPr>
-        <p:spPr>
-          <a:xfrm>
-            <a:off x="4767643" y="1964358"/>
-            <a:ext cx="140086" cy="140086"/>
-          </a:xfrm>
-          <a:prstGeom prst="ellipse">
-            <a:avLst/>
-          </a:prstGeom>
-          <a:solidFill>
-            <a:schemeClr val="accent6">
-              <a:lumMod val="40000"/>
-              <a:lumOff val="60000"/>
-            </a:schemeClr>
-          </a:solidFill>
-          <a:ln>
-            <a:solidFill>
-              <a:schemeClr val="tx1"/>
-            </a:solidFill>
-          </a:ln>
-        </p:spPr>
-        <p:style>
-          <a:lnRef idx="3">
-            <a:schemeClr val="lt1"/>
-          </a:lnRef>
-          <a:fillRef idx="1">
-            <a:schemeClr val="accent6"/>
-          </a:fillRef>
-          <a:effectRef idx="1">
-            <a:schemeClr val="accent6"/>
-          </a:effectRef>
-          <a:fontRef idx="minor">
-            <a:schemeClr val="lt1"/>
-          </a:fontRef>
-        </p:style>
-        <p:txBody>
-          <a:bodyPr rtlCol="0" anchor="ctr"/>
-          <a:lstStyle/>
-          <a:p>
-            <a:pPr algn="ctr"/>
-            <a:endParaRPr lang="en-US"/>
-          </a:p>
-        </p:txBody>
-      </p:sp>
-      <p:sp>
-        <p:nvSpPr>
-          <p:cNvPr id="59" name="Oval 58">
-            <a:extLst>
-              <a:ext uri="{FF2B5EF4-FFF2-40B4-BE49-F238E27FC236}">
-                <a16:creationId xmlns:a16="http://schemas.microsoft.com/office/drawing/2014/main" id="{318541E5-A33C-7F52-D7F7-E116DDE81EA7}"/>
-              </a:ext>
-            </a:extLst>
-          </p:cNvPr>
-          <p:cNvSpPr/>
-          <p:nvPr/>
-        </p:nvSpPr>
-        <p:spPr>
-          <a:xfrm>
-            <a:off x="4934331" y="1959591"/>
             <a:ext cx="140086" cy="140086"/>
           </a:xfrm>
           <a:prstGeom prst="ellipse">

</xml_diff>

<commit_message>
Chapter 4 proof read and revisions (#171)
**Pull Request Description**

Edits and remaining revisions to chapter 4.

Closes #92 
Closed #149 

---

**Licensing Certification**

GitKit is a [Free Cultural Work](https://freedomdefined.org/Definition)
and all accepted contributions are licensed as described in the
LICENSE.md file. This requires that the contributor holds the rights to
do so. By submitting this pull request **I certify that I satisfy the
terms of the [Developer Certificate of
Origin](https://developercertificate.org/)** for its contents.
</commit_message>
<xml_diff>
--- a/materials/images/GitKit-Text-Soure-Images.pptx
+++ b/materials/images/GitKit-Text-Soure-Images.pptx
@@ -137,6 +137,67 @@
 </p:presentation>
 </file>
 
+<file path=ppt/changesInfos/changesInfo1.xml><?xml version="1.0" encoding="utf-8"?>
+<pc:chgInfo xmlns:a="http://schemas.openxmlformats.org/drawingml/2006/main" xmlns:r="http://schemas.openxmlformats.org/officeDocument/2006/relationships" xmlns:ac="http://schemas.microsoft.com/office/drawing/2013/main/command" xmlns:pc="http://schemas.microsoft.com/office/powerpoint/2013/main/command">
+  <pc:docChgLst>
+    <pc:chgData name="Braught, Grant" userId="13082181-f9d5-4011-899e-2afe75cd93c2" providerId="ADAL" clId="{7D2CC41B-BB9E-8945-B803-607365FBBFE9}"/>
+    <pc:docChg chg="undo custSel modSld">
+      <pc:chgData name="Braught, Grant" userId="13082181-f9d5-4011-899e-2afe75cd93c2" providerId="ADAL" clId="{7D2CC41B-BB9E-8945-B803-607365FBBFE9}" dt="2025-02-09T22:55:40.903" v="11" actId="478"/>
+      <pc:docMkLst>
+        <pc:docMk/>
+      </pc:docMkLst>
+      <pc:sldChg chg="addSp delSp mod">
+        <pc:chgData name="Braught, Grant" userId="13082181-f9d5-4011-899e-2afe75cd93c2" providerId="ADAL" clId="{7D2CC41B-BB9E-8945-B803-607365FBBFE9}" dt="2025-02-09T22:55:40.903" v="11" actId="478"/>
+        <pc:sldMkLst>
+          <pc:docMk/>
+          <pc:sldMk cId="1658481695" sldId="278"/>
+        </pc:sldMkLst>
+        <pc:spChg chg="add del">
+          <ac:chgData name="Braught, Grant" userId="13082181-f9d5-4011-899e-2afe75cd93c2" providerId="ADAL" clId="{7D2CC41B-BB9E-8945-B803-607365FBBFE9}" dt="2025-02-09T22:55:34.346" v="8" actId="478"/>
+          <ac:spMkLst>
+            <pc:docMk/>
+            <pc:sldMk cId="1658481695" sldId="278"/>
+            <ac:spMk id="9" creationId="{D41D927E-AEF2-9537-2250-CB19245F1978}"/>
+          </ac:spMkLst>
+        </pc:spChg>
+        <pc:spChg chg="add del">
+          <ac:chgData name="Braught, Grant" userId="13082181-f9d5-4011-899e-2afe75cd93c2" providerId="ADAL" clId="{7D2CC41B-BB9E-8945-B803-607365FBBFE9}" dt="2025-02-09T22:55:39.755" v="10" actId="478"/>
+          <ac:spMkLst>
+            <pc:docMk/>
+            <pc:sldMk cId="1658481695" sldId="278"/>
+            <ac:spMk id="41" creationId="{D92B3D46-C7F4-E8F5-D0C0-402F96C46710}"/>
+          </ac:spMkLst>
+        </pc:spChg>
+        <pc:spChg chg="add del">
+          <ac:chgData name="Braught, Grant" userId="13082181-f9d5-4011-899e-2afe75cd93c2" providerId="ADAL" clId="{7D2CC41B-BB9E-8945-B803-607365FBBFE9}" dt="2025-02-09T22:55:38.343" v="9" actId="478"/>
+          <ac:spMkLst>
+            <pc:docMk/>
+            <pc:sldMk cId="1658481695" sldId="278"/>
+            <ac:spMk id="58" creationId="{8A711A4D-FC20-6662-D84D-705BC85C4974}"/>
+          </ac:spMkLst>
+        </pc:spChg>
+        <pc:spChg chg="del">
+          <ac:chgData name="Braught, Grant" userId="13082181-f9d5-4011-899e-2afe75cd93c2" providerId="ADAL" clId="{7D2CC41B-BB9E-8945-B803-607365FBBFE9}" dt="2025-02-09T22:52:30.555" v="0" actId="478"/>
+          <ac:spMkLst>
+            <pc:docMk/>
+            <pc:sldMk cId="1658481695" sldId="278"/>
+            <ac:spMk id="59" creationId="{318541E5-A33C-7F52-D7F7-E116DDE81EA7}"/>
+          </ac:spMkLst>
+        </pc:spChg>
+        <pc:cxnChg chg="add del">
+          <ac:chgData name="Braught, Grant" userId="13082181-f9d5-4011-899e-2afe75cd93c2" providerId="ADAL" clId="{7D2CC41B-BB9E-8945-B803-607365FBBFE9}" dt="2025-02-09T22:55:40.903" v="11" actId="478"/>
+          <ac:cxnSpMkLst>
+            <pc:docMk/>
+            <pc:sldMk cId="1658481695" sldId="278"/>
+            <ac:cxnSpMk id="40" creationId="{484B8BF8-BAA9-5ABD-178B-0DC6844108E1}"/>
+          </ac:cxnSpMkLst>
+        </pc:cxnChg>
+      </pc:sldChg>
+    </pc:docChg>
+  </pc:docChgLst>
+</pc:chgInfo>
+</file>
+
 <file path=ppt/notesMasters/notesMaster1.xml><?xml version="1.0" encoding="utf-8"?>
 <p:notesMaster xmlns:a="http://schemas.openxmlformats.org/drawingml/2006/main" xmlns:r="http://schemas.openxmlformats.org/officeDocument/2006/relationships" xmlns:p="http://schemas.openxmlformats.org/presentationml/2006/main">
   <p:cSld>
@@ -219,7 +280,7 @@
           <a:p>
             <a:fld id="{54450688-851B-C844-9616-D91E312B1884}" type="datetimeFigureOut">
               <a:rPr lang="en-US" smtClean="0"/>
-              <a:t>1/25/25</a:t>
+              <a:t>2/9/25</a:t>
             </a:fld>
             <a:endParaRPr lang="en-US"/>
           </a:p>
@@ -769,7 +830,7 @@
           <a:p>
             <a:fld id="{7A82D7F2-23D8-094A-BC7F-45020389E464}" type="datetimeFigureOut">
               <a:rPr lang="en-US" smtClean="0"/>
-              <a:t>1/25/25</a:t>
+              <a:t>2/9/25</a:t>
             </a:fld>
             <a:endParaRPr lang="en-US"/>
           </a:p>
@@ -966,7 +1027,7 @@
           <a:p>
             <a:fld id="{7A82D7F2-23D8-094A-BC7F-45020389E464}" type="datetimeFigureOut">
               <a:rPr lang="en-US" smtClean="0"/>
-              <a:t>1/25/25</a:t>
+              <a:t>2/9/25</a:t>
             </a:fld>
             <a:endParaRPr lang="en-US"/>
           </a:p>
@@ -1240,7 +1301,7 @@
           <a:p>
             <a:fld id="{7A82D7F2-23D8-094A-BC7F-45020389E464}" type="datetimeFigureOut">
               <a:rPr lang="en-US" smtClean="0"/>
-              <a:t>1/25/25</a:t>
+              <a:t>2/9/25</a:t>
             </a:fld>
             <a:endParaRPr lang="en-US"/>
           </a:p>
@@ -1424,7 +1485,7 @@
           <a:p>
             <a:fld id="{7A82D7F2-23D8-094A-BC7F-45020389E464}" type="datetimeFigureOut">
               <a:rPr lang="en-US" smtClean="0"/>
-              <a:t>1/25/25</a:t>
+              <a:t>2/9/25</a:t>
             </a:fld>
             <a:endParaRPr lang="en-US"/>
           </a:p>
@@ -1628,7 +1689,7 @@
           <a:p>
             <a:fld id="{7A82D7F2-23D8-094A-BC7F-45020389E464}" type="datetimeFigureOut">
               <a:rPr lang="en-US" smtClean="0"/>
-              <a:t>1/25/25</a:t>
+              <a:t>2/9/25</a:t>
             </a:fld>
             <a:endParaRPr lang="en-US"/>
           </a:p>
@@ -1875,7 +1936,7 @@
           <a:p>
             <a:fld id="{7A82D7F2-23D8-094A-BC7F-45020389E464}" type="datetimeFigureOut">
               <a:rPr lang="en-US" smtClean="0"/>
-              <a:t>1/25/25</a:t>
+              <a:t>2/9/25</a:t>
             </a:fld>
             <a:endParaRPr lang="en-US"/>
           </a:p>
@@ -2203,7 +2264,7 @@
           <a:p>
             <a:fld id="{7A82D7F2-23D8-094A-BC7F-45020389E464}" type="datetimeFigureOut">
               <a:rPr lang="en-US" smtClean="0"/>
-              <a:t>1/25/25</a:t>
+              <a:t>2/9/25</a:t>
             </a:fld>
             <a:endParaRPr lang="en-US"/>
           </a:p>
@@ -2506,7 +2567,7 @@
           <a:p>
             <a:fld id="{7A82D7F2-23D8-094A-BC7F-45020389E464}" type="datetimeFigureOut">
               <a:rPr lang="en-US" smtClean="0"/>
-              <a:t>1/25/25</a:t>
+              <a:t>2/9/25</a:t>
             </a:fld>
             <a:endParaRPr lang="en-US"/>
           </a:p>
@@ -2967,7 +3028,7 @@
           <a:p>
             <a:fld id="{7A82D7F2-23D8-094A-BC7F-45020389E464}" type="datetimeFigureOut">
               <a:rPr lang="en-US" smtClean="0"/>
-              <a:t>1/25/25</a:t>
+              <a:t>2/9/25</a:t>
             </a:fld>
             <a:endParaRPr lang="en-US"/>
           </a:p>
@@ -3085,7 +3146,7 @@
           <a:p>
             <a:fld id="{7A82D7F2-23D8-094A-BC7F-45020389E464}" type="datetimeFigureOut">
               <a:rPr lang="en-US" smtClean="0"/>
-              <a:t>1/25/25</a:t>
+              <a:t>2/9/25</a:t>
             </a:fld>
             <a:endParaRPr lang="en-US"/>
           </a:p>
@@ -3180,7 +3241,7 @@
           <a:p>
             <a:fld id="{7A82D7F2-23D8-094A-BC7F-45020389E464}" type="datetimeFigureOut">
               <a:rPr lang="en-US" smtClean="0"/>
-              <a:t>1/25/25</a:t>
+              <a:t>2/9/25</a:t>
             </a:fld>
             <a:endParaRPr lang="en-US"/>
           </a:p>
@@ -3467,7 +3528,7 @@
           <a:p>
             <a:fld id="{7A82D7F2-23D8-094A-BC7F-45020389E464}" type="datetimeFigureOut">
               <a:rPr lang="en-US" smtClean="0"/>
-              <a:t>1/25/25</a:t>
+              <a:t>2/9/25</a:t>
             </a:fld>
             <a:endParaRPr lang="en-US"/>
           </a:p>
@@ -3681,7 +3742,7 @@
           <a:p>
             <a:fld id="{7A82D7F2-23D8-094A-BC7F-45020389E464}" type="datetimeFigureOut">
               <a:rPr lang="en-US" smtClean="0"/>
-              <a:t>1/25/25</a:t>
+              <a:t>2/9/25</a:t>
             </a:fld>
             <a:endParaRPr lang="en-US"/>
           </a:p>
@@ -19316,99 +19377,6 @@
           </a:p>
         </p:txBody>
       </p:sp>
-      <p:cxnSp>
-        <p:nvCxnSpPr>
-          <p:cNvPr id="40" name="Straight Connector 39">
-            <a:extLst>
-              <a:ext uri="{FF2B5EF4-FFF2-40B4-BE49-F238E27FC236}">
-                <a16:creationId xmlns:a16="http://schemas.microsoft.com/office/drawing/2014/main" id="{484B8BF8-BAA9-5ABD-178B-0DC6844108E1}"/>
-              </a:ext>
-            </a:extLst>
-          </p:cNvPr>
-          <p:cNvCxnSpPr/>
-          <p:nvPr/>
-        </p:nvCxnSpPr>
-        <p:spPr>
-          <a:xfrm flipV="1">
-            <a:off x="4495685" y="2035080"/>
-            <a:ext cx="105890" cy="3288"/>
-          </a:xfrm>
-          <a:prstGeom prst="line">
-            <a:avLst/>
-          </a:prstGeom>
-          <a:ln>
-            <a:solidFill>
-              <a:schemeClr val="tx1"/>
-            </a:solidFill>
-          </a:ln>
-        </p:spPr>
-        <p:style>
-          <a:lnRef idx="3">
-            <a:schemeClr val="accent5"/>
-          </a:lnRef>
-          <a:fillRef idx="0">
-            <a:schemeClr val="accent5"/>
-          </a:fillRef>
-          <a:effectRef idx="2">
-            <a:schemeClr val="accent5"/>
-          </a:effectRef>
-          <a:fontRef idx="minor">
-            <a:schemeClr val="tx1"/>
-          </a:fontRef>
-        </p:style>
-      </p:cxnSp>
-      <p:sp>
-        <p:nvSpPr>
-          <p:cNvPr id="41" name="Oval 40">
-            <a:extLst>
-              <a:ext uri="{FF2B5EF4-FFF2-40B4-BE49-F238E27FC236}">
-                <a16:creationId xmlns:a16="http://schemas.microsoft.com/office/drawing/2014/main" id="{D92B3D46-C7F4-E8F5-D0C0-402F96C46710}"/>
-              </a:ext>
-            </a:extLst>
-          </p:cNvPr>
-          <p:cNvSpPr/>
-          <p:nvPr/>
-        </p:nvSpPr>
-        <p:spPr>
-          <a:xfrm>
-            <a:off x="4596201" y="1964358"/>
-            <a:ext cx="140086" cy="140086"/>
-          </a:xfrm>
-          <a:prstGeom prst="ellipse">
-            <a:avLst/>
-          </a:prstGeom>
-          <a:solidFill>
-            <a:srgbClr val="00B0F0"/>
-          </a:solidFill>
-          <a:ln>
-            <a:solidFill>
-              <a:schemeClr val="tx1"/>
-            </a:solidFill>
-          </a:ln>
-        </p:spPr>
-        <p:style>
-          <a:lnRef idx="3">
-            <a:schemeClr val="lt1"/>
-          </a:lnRef>
-          <a:fillRef idx="1">
-            <a:schemeClr val="accent6"/>
-          </a:fillRef>
-          <a:effectRef idx="1">
-            <a:schemeClr val="accent6"/>
-          </a:effectRef>
-          <a:fontRef idx="minor">
-            <a:schemeClr val="lt1"/>
-          </a:fontRef>
-        </p:style>
-        <p:txBody>
-          <a:bodyPr rtlCol="0" anchor="ctr"/>
-          <a:lstStyle/>
-          <a:p>
-            <a:pPr algn="ctr"/>
-            <a:endParaRPr lang="en-US"/>
-          </a:p>
-        </p:txBody>
-      </p:sp>
       <p:sp>
         <p:nvSpPr>
           <p:cNvPr id="42" name="Up Arrow 41">
@@ -20106,116 +20074,6 @@
         <p:spPr>
           <a:xfrm>
             <a:off x="4934332" y="4674236"/>
-            <a:ext cx="140086" cy="140086"/>
-          </a:xfrm>
-          <a:prstGeom prst="ellipse">
-            <a:avLst/>
-          </a:prstGeom>
-          <a:solidFill>
-            <a:schemeClr val="accent5">
-              <a:lumMod val="60000"/>
-              <a:lumOff val="40000"/>
-            </a:schemeClr>
-          </a:solidFill>
-          <a:ln>
-            <a:solidFill>
-              <a:schemeClr val="tx1"/>
-            </a:solidFill>
-          </a:ln>
-        </p:spPr>
-        <p:style>
-          <a:lnRef idx="3">
-            <a:schemeClr val="lt1"/>
-          </a:lnRef>
-          <a:fillRef idx="1">
-            <a:schemeClr val="accent6"/>
-          </a:fillRef>
-          <a:effectRef idx="1">
-            <a:schemeClr val="accent6"/>
-          </a:effectRef>
-          <a:fontRef idx="minor">
-            <a:schemeClr val="lt1"/>
-          </a:fontRef>
-        </p:style>
-        <p:txBody>
-          <a:bodyPr rtlCol="0" anchor="ctr"/>
-          <a:lstStyle/>
-          <a:p>
-            <a:pPr algn="ctr"/>
-            <a:endParaRPr lang="en-US"/>
-          </a:p>
-        </p:txBody>
-      </p:sp>
-      <p:sp>
-        <p:nvSpPr>
-          <p:cNvPr id="58" name="Oval 57">
-            <a:extLst>
-              <a:ext uri="{FF2B5EF4-FFF2-40B4-BE49-F238E27FC236}">
-                <a16:creationId xmlns:a16="http://schemas.microsoft.com/office/drawing/2014/main" id="{8A711A4D-FC20-6662-D84D-705BC85C4974}"/>
-              </a:ext>
-            </a:extLst>
-          </p:cNvPr>
-          <p:cNvSpPr/>
-          <p:nvPr/>
-        </p:nvSpPr>
-        <p:spPr>
-          <a:xfrm>
-            <a:off x="4767643" y="1964358"/>
-            <a:ext cx="140086" cy="140086"/>
-          </a:xfrm>
-          <a:prstGeom prst="ellipse">
-            <a:avLst/>
-          </a:prstGeom>
-          <a:solidFill>
-            <a:schemeClr val="accent6">
-              <a:lumMod val="40000"/>
-              <a:lumOff val="60000"/>
-            </a:schemeClr>
-          </a:solidFill>
-          <a:ln>
-            <a:solidFill>
-              <a:schemeClr val="tx1"/>
-            </a:solidFill>
-          </a:ln>
-        </p:spPr>
-        <p:style>
-          <a:lnRef idx="3">
-            <a:schemeClr val="lt1"/>
-          </a:lnRef>
-          <a:fillRef idx="1">
-            <a:schemeClr val="accent6"/>
-          </a:fillRef>
-          <a:effectRef idx="1">
-            <a:schemeClr val="accent6"/>
-          </a:effectRef>
-          <a:fontRef idx="minor">
-            <a:schemeClr val="lt1"/>
-          </a:fontRef>
-        </p:style>
-        <p:txBody>
-          <a:bodyPr rtlCol="0" anchor="ctr"/>
-          <a:lstStyle/>
-          <a:p>
-            <a:pPr algn="ctr"/>
-            <a:endParaRPr lang="en-US"/>
-          </a:p>
-        </p:txBody>
-      </p:sp>
-      <p:sp>
-        <p:nvSpPr>
-          <p:cNvPr id="59" name="Oval 58">
-            <a:extLst>
-              <a:ext uri="{FF2B5EF4-FFF2-40B4-BE49-F238E27FC236}">
-                <a16:creationId xmlns:a16="http://schemas.microsoft.com/office/drawing/2014/main" id="{318541E5-A33C-7F52-D7F7-E116DDE81EA7}"/>
-              </a:ext>
-            </a:extLst>
-          </p:cNvPr>
-          <p:cNvSpPr/>
-          <p:nvPr/>
-        </p:nvSpPr>
-        <p:spPr>
-          <a:xfrm>
-            <a:off x="4934331" y="1959591"/>
             <a:ext cx="140086" cy="140086"/>
           </a:xfrm>
           <a:prstGeom prst="ellipse">

</xml_diff>